<commit_message>
Avancements pour soutennace blanche
</commit_message>
<xml_diff>
--- a/P5_JeremyMERGOUD_Présentation.pptx
+++ b/P5_JeremyMERGOUD_Présentation.pptx
@@ -18,7 +18,6 @@
     <p:sldId id="303" r:id="rId12"/>
     <p:sldId id="304" r:id="rId13"/>
     <p:sldId id="305" r:id="rId14"/>
-    <p:sldId id="281" r:id="rId15"/>
   </p:sldIdLst>
   <p:sldSz cx="12192000" cy="6858000"/>
   <p:notesSz cx="6858000" cy="9144000"/>
@@ -283,7 +282,7 @@
           <a:p>
             <a:fld id="{F0F2E3BF-8582-4A29-A9CE-2B6B022034BB}" type="datetimeFigureOut">
               <a:rPr lang="fr-FR" smtClean="0"/>
-              <a:t>18/06/2021</a:t>
+              <a:t>21/06/2021</a:t>
             </a:fld>
             <a:endParaRPr lang="fr-FR" dirty="0"/>
           </a:p>
@@ -481,7 +480,7 @@
           <a:p>
             <a:fld id="{F0F2E3BF-8582-4A29-A9CE-2B6B022034BB}" type="datetimeFigureOut">
               <a:rPr lang="fr-FR" smtClean="0"/>
-              <a:t>18/06/2021</a:t>
+              <a:t>21/06/2021</a:t>
             </a:fld>
             <a:endParaRPr lang="fr-FR" dirty="0"/>
           </a:p>
@@ -689,7 +688,7 @@
           <a:p>
             <a:fld id="{F0F2E3BF-8582-4A29-A9CE-2B6B022034BB}" type="datetimeFigureOut">
               <a:rPr lang="fr-FR" smtClean="0"/>
-              <a:t>18/06/2021</a:t>
+              <a:t>21/06/2021</a:t>
             </a:fld>
             <a:endParaRPr lang="fr-FR" dirty="0"/>
           </a:p>
@@ -887,7 +886,7 @@
           <a:p>
             <a:fld id="{F0F2E3BF-8582-4A29-A9CE-2B6B022034BB}" type="datetimeFigureOut">
               <a:rPr lang="fr-FR" smtClean="0"/>
-              <a:t>18/06/2021</a:t>
+              <a:t>21/06/2021</a:t>
             </a:fld>
             <a:endParaRPr lang="fr-FR" dirty="0"/>
           </a:p>
@@ -1162,7 +1161,7 @@
           <a:p>
             <a:fld id="{F0F2E3BF-8582-4A29-A9CE-2B6B022034BB}" type="datetimeFigureOut">
               <a:rPr lang="fr-FR" smtClean="0"/>
-              <a:t>18/06/2021</a:t>
+              <a:t>21/06/2021</a:t>
             </a:fld>
             <a:endParaRPr lang="fr-FR" dirty="0"/>
           </a:p>
@@ -1427,7 +1426,7 @@
           <a:p>
             <a:fld id="{F0F2E3BF-8582-4A29-A9CE-2B6B022034BB}" type="datetimeFigureOut">
               <a:rPr lang="fr-FR" smtClean="0"/>
-              <a:t>18/06/2021</a:t>
+              <a:t>21/06/2021</a:t>
             </a:fld>
             <a:endParaRPr lang="fr-FR" dirty="0"/>
           </a:p>
@@ -1839,7 +1838,7 @@
           <a:p>
             <a:fld id="{F0F2E3BF-8582-4A29-A9CE-2B6B022034BB}" type="datetimeFigureOut">
               <a:rPr lang="fr-FR" smtClean="0"/>
-              <a:t>18/06/2021</a:t>
+              <a:t>21/06/2021</a:t>
             </a:fld>
             <a:endParaRPr lang="fr-FR" dirty="0"/>
           </a:p>
@@ -1980,7 +1979,7 @@
           <a:p>
             <a:fld id="{F0F2E3BF-8582-4A29-A9CE-2B6B022034BB}" type="datetimeFigureOut">
               <a:rPr lang="fr-FR" smtClean="0"/>
-              <a:t>18/06/2021</a:t>
+              <a:t>21/06/2021</a:t>
             </a:fld>
             <a:endParaRPr lang="fr-FR" dirty="0"/>
           </a:p>
@@ -2093,7 +2092,7 @@
           <a:p>
             <a:fld id="{F0F2E3BF-8582-4A29-A9CE-2B6B022034BB}" type="datetimeFigureOut">
               <a:rPr lang="fr-FR" smtClean="0"/>
-              <a:t>18/06/2021</a:t>
+              <a:t>21/06/2021</a:t>
             </a:fld>
             <a:endParaRPr lang="fr-FR" dirty="0"/>
           </a:p>
@@ -2404,7 +2403,7 @@
           <a:p>
             <a:fld id="{F0F2E3BF-8582-4A29-A9CE-2B6B022034BB}" type="datetimeFigureOut">
               <a:rPr lang="fr-FR" smtClean="0"/>
-              <a:t>18/06/2021</a:t>
+              <a:t>21/06/2021</a:t>
             </a:fld>
             <a:endParaRPr lang="fr-FR" dirty="0"/>
           </a:p>
@@ -2692,7 +2691,7 @@
           <a:p>
             <a:fld id="{F0F2E3BF-8582-4A29-A9CE-2B6B022034BB}" type="datetimeFigureOut">
               <a:rPr lang="fr-FR" smtClean="0"/>
-              <a:t>18/06/2021</a:t>
+              <a:t>21/06/2021</a:t>
             </a:fld>
             <a:endParaRPr lang="fr-FR" dirty="0"/>
           </a:p>
@@ -2933,7 +2932,7 @@
           <a:p>
             <a:fld id="{F0F2E3BF-8582-4A29-A9CE-2B6B022034BB}" type="datetimeFigureOut">
               <a:rPr lang="fr-FR" smtClean="0"/>
-              <a:t>18/06/2021</a:t>
+              <a:t>21/06/2021</a:t>
             </a:fld>
             <a:endParaRPr lang="fr-FR" dirty="0"/>
           </a:p>
@@ -3360,7 +3359,7 @@
       </p:grpSpPr>
       <p:pic>
         <p:nvPicPr>
-          <p:cNvPr id="9" name="Image 8" descr="Une image contenant arme&#10;&#10;Description générée automatiquement">
+          <p:cNvPr id="9" name="Image 8">
             <a:extLst>
               <a:ext uri="{FF2B5EF4-FFF2-40B4-BE49-F238E27FC236}">
                 <a16:creationId xmlns:a16="http://schemas.microsoft.com/office/drawing/2014/main" id="{6FFA51AF-752E-48E0-A823-603009AC6AF1}"/>
@@ -3380,14 +3379,13 @@
               </a:ext>
             </a:extLst>
           </a:blip>
-          <a:stretch>
-            <a:fillRect/>
-          </a:stretch>
+          <a:srcRect/>
+          <a:stretch/>
         </p:blipFill>
         <p:spPr>
           <a:xfrm>
-            <a:off x="1946988" y="-673617"/>
-            <a:ext cx="8298024" cy="8205234"/>
+            <a:off x="1946988" y="-37347"/>
+            <a:ext cx="8298024" cy="6932694"/>
           </a:xfrm>
           <a:prstGeom prst="rect">
             <a:avLst/>
@@ -3412,7 +3410,7 @@
         </p:nvSpPr>
         <p:spPr>
           <a:xfrm>
-            <a:off x="1524000" y="4289959"/>
+            <a:off x="1524000" y="4961079"/>
             <a:ext cx="9144000" cy="746642"/>
           </a:xfrm>
         </p:spPr>
@@ -3448,7 +3446,7 @@
         </p:nvSpPr>
         <p:spPr>
           <a:xfrm>
-            <a:off x="4746000" y="189000"/>
+            <a:off x="4746000" y="860120"/>
             <a:ext cx="2700000" cy="2700000"/>
           </a:xfrm>
           <a:prstGeom prst="ellipse">
@@ -3516,7 +3514,7 @@
         </p:blipFill>
         <p:spPr>
           <a:xfrm>
-            <a:off x="5143500" y="647700"/>
+            <a:off x="5143500" y="1318820"/>
             <a:ext cx="1905000" cy="1905000"/>
           </a:xfrm>
           <a:prstGeom prst="rect">
@@ -3540,8 +3538,8 @@
         </p:nvSpPr>
         <p:spPr>
           <a:xfrm>
-            <a:off x="1524000" y="5349874"/>
-            <a:ext cx="9144000" cy="1213643"/>
+            <a:off x="1524000" y="6020994"/>
+            <a:ext cx="9144000" cy="555975"/>
           </a:xfrm>
           <a:prstGeom prst="rect">
             <a:avLst/>
@@ -3754,7 +3752,7 @@
         </p:blipFill>
         <p:spPr>
           <a:xfrm>
-            <a:off x="3810000" y="2881312"/>
+            <a:off x="3810000" y="3552432"/>
             <a:ext cx="4572000" cy="1095375"/>
           </a:xfrm>
           <a:prstGeom prst="rect">
@@ -3794,10 +3792,10 @@
       </p:grpSpPr>
       <p:pic>
         <p:nvPicPr>
-          <p:cNvPr id="16" name="Image 15" descr="Une image contenant arme&#10;&#10;Description générée automatiquement">
-            <a:extLst>
-              <a:ext uri="{FF2B5EF4-FFF2-40B4-BE49-F238E27FC236}">
-                <a16:creationId xmlns:a16="http://schemas.microsoft.com/office/drawing/2014/main" id="{83760680-24B5-4E26-A2A3-CABE065DAAC4}"/>
+          <p:cNvPr id="6" name="Image 5">
+            <a:extLst>
+              <a:ext uri="{FF2B5EF4-FFF2-40B4-BE49-F238E27FC236}">
+                <a16:creationId xmlns:a16="http://schemas.microsoft.com/office/drawing/2014/main" id="{41881A36-520A-4FFB-B0F3-69A08D1FF934}"/>
               </a:ext>
             </a:extLst>
           </p:cNvPr>
@@ -3814,14 +3812,13 @@
               </a:ext>
             </a:extLst>
           </a:blip>
-          <a:stretch>
-            <a:fillRect/>
-          </a:stretch>
+          <a:srcRect/>
+          <a:stretch/>
         </p:blipFill>
         <p:spPr>
           <a:xfrm rot="12211122">
-            <a:off x="-1743927" y="-5073941"/>
-            <a:ext cx="6935554" cy="6858000"/>
+            <a:off x="-1707608" y="-4046484"/>
+            <a:ext cx="6935554" cy="5794400"/>
           </a:xfrm>
           <a:prstGeom prst="rect">
             <a:avLst/>
@@ -3982,7 +3979,7 @@
       </p:grpSpPr>
       <p:pic>
         <p:nvPicPr>
-          <p:cNvPr id="9" name="Image 8" descr="Une image contenant arme&#10;&#10;Description générée automatiquement">
+          <p:cNvPr id="9" name="Image 8">
             <a:extLst>
               <a:ext uri="{FF2B5EF4-FFF2-40B4-BE49-F238E27FC236}">
                 <a16:creationId xmlns:a16="http://schemas.microsoft.com/office/drawing/2014/main" id="{6FFA51AF-752E-48E0-A823-603009AC6AF1}"/>
@@ -4002,14 +3999,13 @@
               </a:ext>
             </a:extLst>
           </a:blip>
-          <a:stretch>
-            <a:fillRect/>
-          </a:stretch>
+          <a:srcRect/>
+          <a:stretch/>
         </p:blipFill>
         <p:spPr>
           <a:xfrm>
-            <a:off x="1946988" y="-673617"/>
-            <a:ext cx="8298024" cy="8205234"/>
+            <a:off x="1946988" y="-37347"/>
+            <a:ext cx="8298024" cy="6932694"/>
           </a:xfrm>
           <a:prstGeom prst="rect">
             <a:avLst/>
@@ -4096,7 +4092,7 @@
       </p:grpSpPr>
       <p:pic>
         <p:nvPicPr>
-          <p:cNvPr id="9" name="Image 8" descr="Une image contenant arme&#10;&#10;Description générée automatiquement">
+          <p:cNvPr id="9" name="Image 8">
             <a:extLst>
               <a:ext uri="{FF2B5EF4-FFF2-40B4-BE49-F238E27FC236}">
                 <a16:creationId xmlns:a16="http://schemas.microsoft.com/office/drawing/2014/main" id="{6FFA51AF-752E-48E0-A823-603009AC6AF1}"/>
@@ -4116,14 +4112,13 @@
               </a:ext>
             </a:extLst>
           </a:blip>
-          <a:stretch>
-            <a:fillRect/>
-          </a:stretch>
+          <a:srcRect/>
+          <a:stretch/>
         </p:blipFill>
         <p:spPr>
           <a:xfrm>
-            <a:off x="1946988" y="-673617"/>
-            <a:ext cx="8298024" cy="8205234"/>
+            <a:off x="1946988" y="-37347"/>
+            <a:ext cx="8298024" cy="6932694"/>
           </a:xfrm>
           <a:prstGeom prst="rect">
             <a:avLst/>
@@ -4210,7 +4205,7 @@
       </p:grpSpPr>
       <p:pic>
         <p:nvPicPr>
-          <p:cNvPr id="9" name="Image 8" descr="Une image contenant arme&#10;&#10;Description générée automatiquement">
+          <p:cNvPr id="9" name="Image 8">
             <a:extLst>
               <a:ext uri="{FF2B5EF4-FFF2-40B4-BE49-F238E27FC236}">
                 <a16:creationId xmlns:a16="http://schemas.microsoft.com/office/drawing/2014/main" id="{6FFA51AF-752E-48E0-A823-603009AC6AF1}"/>
@@ -4230,14 +4225,13 @@
               </a:ext>
             </a:extLst>
           </a:blip>
-          <a:stretch>
-            <a:fillRect/>
-          </a:stretch>
+          <a:srcRect/>
+          <a:stretch/>
         </p:blipFill>
         <p:spPr>
           <a:xfrm>
-            <a:off x="1946988" y="-673617"/>
-            <a:ext cx="8298024" cy="8205234"/>
+            <a:off x="1946988" y="-37347"/>
+            <a:ext cx="8298024" cy="6932694"/>
           </a:xfrm>
           <a:prstGeom prst="rect">
             <a:avLst/>
@@ -4288,431 +4282,6 @@
     <p:extLst>
       <p:ext uri="{BB962C8B-B14F-4D97-AF65-F5344CB8AC3E}">
         <p14:creationId xmlns:p14="http://schemas.microsoft.com/office/powerpoint/2010/main" val="1419036162"/>
-      </p:ext>
-    </p:extLst>
-  </p:cSld>
-  <p:clrMapOvr>
-    <a:masterClrMapping/>
-  </p:clrMapOvr>
-</p:sld>
-</file>
-
-<file path=ppt/slides/slide14.xml><?xml version="1.0" encoding="utf-8"?>
-<p:sld xmlns:a="http://schemas.openxmlformats.org/drawingml/2006/main" xmlns:r="http://schemas.openxmlformats.org/officeDocument/2006/relationships" xmlns:p="http://schemas.openxmlformats.org/presentationml/2006/main">
-  <p:cSld>
-    <p:spTree>
-      <p:nvGrpSpPr>
-        <p:cNvPr id="1" name=""/>
-        <p:cNvGrpSpPr/>
-        <p:nvPr/>
-      </p:nvGrpSpPr>
-      <p:grpSpPr>
-        <a:xfrm>
-          <a:off x="0" y="0"/>
-          <a:ext cx="0" cy="0"/>
-          <a:chOff x="0" y="0"/>
-          <a:chExt cx="0" cy="0"/>
-        </a:xfrm>
-      </p:grpSpPr>
-      <p:pic>
-        <p:nvPicPr>
-          <p:cNvPr id="4" name="Image 3" descr="Une image contenant arme&#10;&#10;Description générée automatiquement">
-            <a:extLst>
-              <a:ext uri="{FF2B5EF4-FFF2-40B4-BE49-F238E27FC236}">
-                <a16:creationId xmlns:a16="http://schemas.microsoft.com/office/drawing/2014/main" id="{823961C3-D85E-492E-A601-03E972A55CFA}"/>
-              </a:ext>
-            </a:extLst>
-          </p:cNvPr>
-          <p:cNvPicPr>
-            <a:picLocks noChangeAspect="1"/>
-          </p:cNvPicPr>
-          <p:nvPr/>
-        </p:nvPicPr>
-        <p:blipFill>
-          <a:blip r:embed="rId2">
-            <a:extLst>
-              <a:ext uri="{28A0092B-C50C-407E-A947-70E740481C1C}">
-                <a14:useLocalDpi xmlns:a14="http://schemas.microsoft.com/office/drawing/2010/main" val="0"/>
-              </a:ext>
-            </a:extLst>
-          </a:blip>
-          <a:stretch>
-            <a:fillRect/>
-          </a:stretch>
-        </p:blipFill>
-        <p:spPr>
-          <a:xfrm rot="11256025">
-            <a:off x="4674969" y="2023858"/>
-            <a:ext cx="2842065" cy="2810285"/>
-          </a:xfrm>
-          <a:prstGeom prst="rect">
-            <a:avLst/>
-          </a:prstGeom>
-        </p:spPr>
-      </p:pic>
-      <p:sp>
-        <p:nvSpPr>
-          <p:cNvPr id="3" name="Rectangle 2">
-            <a:extLst>
-              <a:ext uri="{FF2B5EF4-FFF2-40B4-BE49-F238E27FC236}">
-                <a16:creationId xmlns:a16="http://schemas.microsoft.com/office/drawing/2014/main" id="{393CE35F-9500-4ED9-A2BA-9AF9831ACA2A}"/>
-              </a:ext>
-            </a:extLst>
-          </p:cNvPr>
-          <p:cNvSpPr/>
-          <p:nvPr/>
-        </p:nvSpPr>
-        <p:spPr>
-          <a:xfrm>
-            <a:off x="266700" y="204322"/>
-            <a:ext cx="4673600" cy="6449357"/>
-          </a:xfrm>
-          <a:prstGeom prst="rect">
-            <a:avLst/>
-          </a:prstGeom>
-          <a:solidFill>
-            <a:srgbClr val="FCFBC9">
-              <a:alpha val="30196"/>
-            </a:srgbClr>
-          </a:solidFill>
-          <a:ln>
-            <a:solidFill>
-              <a:srgbClr val="632D09"/>
-            </a:solidFill>
-          </a:ln>
-        </p:spPr>
-        <p:style>
-          <a:lnRef idx="2">
-            <a:schemeClr val="accent1">
-              <a:shade val="50000"/>
-            </a:schemeClr>
-          </a:lnRef>
-          <a:fillRef idx="1">
-            <a:schemeClr val="accent1"/>
-          </a:fillRef>
-          <a:effectRef idx="0">
-            <a:schemeClr val="accent1"/>
-          </a:effectRef>
-          <a:fontRef idx="minor">
-            <a:schemeClr val="lt1"/>
-          </a:fontRef>
-        </p:style>
-        <p:txBody>
-          <a:bodyPr rtlCol="0" anchor="ctr"/>
-          <a:lstStyle/>
-          <a:p>
-            <a:pPr algn="ctr"/>
-            <a:endParaRPr lang="fr-FR" dirty="0"/>
-          </a:p>
-        </p:txBody>
-      </p:sp>
-      <p:sp>
-        <p:nvSpPr>
-          <p:cNvPr id="7" name="Rectangle 6">
-            <a:extLst>
-              <a:ext uri="{FF2B5EF4-FFF2-40B4-BE49-F238E27FC236}">
-                <a16:creationId xmlns:a16="http://schemas.microsoft.com/office/drawing/2014/main" id="{B92131F7-8599-4F2F-8FB7-099485FFA1DC}"/>
-              </a:ext>
-            </a:extLst>
-          </p:cNvPr>
-          <p:cNvSpPr/>
-          <p:nvPr/>
-        </p:nvSpPr>
-        <p:spPr>
-          <a:xfrm>
-            <a:off x="7251702" y="204322"/>
-            <a:ext cx="4673600" cy="6449356"/>
-          </a:xfrm>
-          <a:prstGeom prst="rect">
-            <a:avLst/>
-          </a:prstGeom>
-          <a:solidFill>
-            <a:srgbClr val="FCFBC9">
-              <a:alpha val="30196"/>
-            </a:srgbClr>
-          </a:solidFill>
-          <a:ln>
-            <a:solidFill>
-              <a:srgbClr val="632D09"/>
-            </a:solidFill>
-          </a:ln>
-        </p:spPr>
-        <p:style>
-          <a:lnRef idx="2">
-            <a:schemeClr val="accent1">
-              <a:shade val="50000"/>
-            </a:schemeClr>
-          </a:lnRef>
-          <a:fillRef idx="1">
-            <a:schemeClr val="accent1"/>
-          </a:fillRef>
-          <a:effectRef idx="0">
-            <a:schemeClr val="accent1"/>
-          </a:effectRef>
-          <a:fontRef idx="minor">
-            <a:schemeClr val="lt1"/>
-          </a:fontRef>
-        </p:style>
-        <p:txBody>
-          <a:bodyPr rtlCol="0" anchor="ctr"/>
-          <a:lstStyle/>
-          <a:p>
-            <a:pPr algn="ctr"/>
-            <a:endParaRPr lang="fr-FR" dirty="0"/>
-          </a:p>
-        </p:txBody>
-      </p:sp>
-      <p:sp>
-        <p:nvSpPr>
-          <p:cNvPr id="5" name="ZoneTexte 4">
-            <a:extLst>
-              <a:ext uri="{FF2B5EF4-FFF2-40B4-BE49-F238E27FC236}">
-                <a16:creationId xmlns:a16="http://schemas.microsoft.com/office/drawing/2014/main" id="{13F680A1-FD40-4019-8538-D3E57FF2E327}"/>
-              </a:ext>
-            </a:extLst>
-          </p:cNvPr>
-          <p:cNvSpPr txBox="1"/>
-          <p:nvPr/>
-        </p:nvSpPr>
-        <p:spPr>
-          <a:xfrm>
-            <a:off x="4940300" y="1478919"/>
-            <a:ext cx="2311402" cy="369332"/>
-          </a:xfrm>
-          <a:prstGeom prst="rect">
-            <a:avLst/>
-          </a:prstGeom>
-          <a:noFill/>
-        </p:spPr>
-        <p:txBody>
-          <a:bodyPr wrap="square" rtlCol="0">
-            <a:spAutoFit/>
-          </a:bodyPr>
-          <a:lstStyle/>
-          <a:p>
-            <a:pPr algn="r"/>
-            <a:r>
-              <a:rPr lang="fr-FR" b="1" dirty="0">
-                <a:solidFill>
-                  <a:schemeClr val="accent2">
-                    <a:lumMod val="50000"/>
-                  </a:schemeClr>
-                </a:solidFill>
-              </a:rPr>
-              <a:t>Version initiale</a:t>
-            </a:r>
-          </a:p>
-        </p:txBody>
-      </p:sp>
-      <p:sp>
-        <p:nvSpPr>
-          <p:cNvPr id="9" name="ZoneTexte 8">
-            <a:extLst>
-              <a:ext uri="{FF2B5EF4-FFF2-40B4-BE49-F238E27FC236}">
-                <a16:creationId xmlns:a16="http://schemas.microsoft.com/office/drawing/2014/main" id="{3F429E39-4768-4673-9486-ECABA3F2B26D}"/>
-              </a:ext>
-            </a:extLst>
-          </p:cNvPr>
-          <p:cNvSpPr txBox="1"/>
-          <p:nvPr/>
-        </p:nvSpPr>
-        <p:spPr>
-          <a:xfrm>
-            <a:off x="4940300" y="4825084"/>
-            <a:ext cx="2311402" cy="369332"/>
-          </a:xfrm>
-          <a:prstGeom prst="rect">
-            <a:avLst/>
-          </a:prstGeom>
-          <a:noFill/>
-        </p:spPr>
-        <p:txBody>
-          <a:bodyPr wrap="square" rtlCol="0">
-            <a:spAutoFit/>
-          </a:bodyPr>
-          <a:lstStyle/>
-          <a:p>
-            <a:r>
-              <a:rPr lang="fr-FR" b="1" dirty="0">
-                <a:solidFill>
-                  <a:schemeClr val="accent2">
-                    <a:lumMod val="50000"/>
-                  </a:schemeClr>
-                </a:solidFill>
-              </a:rPr>
-              <a:t>Version modifiée</a:t>
-            </a:r>
-          </a:p>
-        </p:txBody>
-      </p:sp>
-      <p:sp>
-        <p:nvSpPr>
-          <p:cNvPr id="6" name="Flèche : droite 5">
-            <a:extLst>
-              <a:ext uri="{FF2B5EF4-FFF2-40B4-BE49-F238E27FC236}">
-                <a16:creationId xmlns:a16="http://schemas.microsoft.com/office/drawing/2014/main" id="{95739CF4-EDA2-4825-8160-2682E82E02BC}"/>
-              </a:ext>
-            </a:extLst>
-          </p:cNvPr>
-          <p:cNvSpPr/>
-          <p:nvPr/>
-        </p:nvSpPr>
-        <p:spPr>
-          <a:xfrm>
-            <a:off x="6680201" y="4914900"/>
-            <a:ext cx="571501" cy="279515"/>
-          </a:xfrm>
-          <a:prstGeom prst="rightArrow">
-            <a:avLst/>
-          </a:prstGeom>
-          <a:solidFill>
-            <a:srgbClr val="632D09"/>
-          </a:solidFill>
-          <a:ln>
-            <a:noFill/>
-          </a:ln>
-        </p:spPr>
-        <p:style>
-          <a:lnRef idx="2">
-            <a:schemeClr val="accent1">
-              <a:shade val="50000"/>
-            </a:schemeClr>
-          </a:lnRef>
-          <a:fillRef idx="1">
-            <a:schemeClr val="accent1"/>
-          </a:fillRef>
-          <a:effectRef idx="0">
-            <a:schemeClr val="accent1"/>
-          </a:effectRef>
-          <a:fontRef idx="minor">
-            <a:schemeClr val="lt1"/>
-          </a:fontRef>
-        </p:style>
-        <p:txBody>
-          <a:bodyPr rtlCol="0" anchor="ctr"/>
-          <a:lstStyle/>
-          <a:p>
-            <a:pPr algn="ctr"/>
-            <a:endParaRPr lang="fr-FR" dirty="0"/>
-          </a:p>
-        </p:txBody>
-      </p:sp>
-      <p:sp>
-        <p:nvSpPr>
-          <p:cNvPr id="11" name="Flèche : droite 10">
-            <a:extLst>
-              <a:ext uri="{FF2B5EF4-FFF2-40B4-BE49-F238E27FC236}">
-                <a16:creationId xmlns:a16="http://schemas.microsoft.com/office/drawing/2014/main" id="{028A2C32-757F-4F49-AC92-BA579FBFA404}"/>
-              </a:ext>
-            </a:extLst>
-          </p:cNvPr>
-          <p:cNvSpPr/>
-          <p:nvPr/>
-        </p:nvSpPr>
-        <p:spPr>
-          <a:xfrm flipH="1">
-            <a:off x="4965701" y="1523828"/>
-            <a:ext cx="571501" cy="279515"/>
-          </a:xfrm>
-          <a:prstGeom prst="rightArrow">
-            <a:avLst/>
-          </a:prstGeom>
-          <a:solidFill>
-            <a:srgbClr val="632D09"/>
-          </a:solidFill>
-          <a:ln>
-            <a:noFill/>
-          </a:ln>
-        </p:spPr>
-        <p:style>
-          <a:lnRef idx="2">
-            <a:schemeClr val="accent1">
-              <a:shade val="50000"/>
-            </a:schemeClr>
-          </a:lnRef>
-          <a:fillRef idx="1">
-            <a:schemeClr val="accent1"/>
-          </a:fillRef>
-          <a:effectRef idx="0">
-            <a:schemeClr val="accent1"/>
-          </a:effectRef>
-          <a:fontRef idx="minor">
-            <a:schemeClr val="lt1"/>
-          </a:fontRef>
-        </p:style>
-        <p:txBody>
-          <a:bodyPr rtlCol="0" anchor="ctr"/>
-          <a:lstStyle/>
-          <a:p>
-            <a:pPr algn="ctr"/>
-            <a:endParaRPr lang="fr-FR" dirty="0"/>
-          </a:p>
-        </p:txBody>
-      </p:sp>
-      <p:pic>
-        <p:nvPicPr>
-          <p:cNvPr id="8" name="Image 7">
-            <a:extLst>
-              <a:ext uri="{FF2B5EF4-FFF2-40B4-BE49-F238E27FC236}">
-                <a16:creationId xmlns:a16="http://schemas.microsoft.com/office/drawing/2014/main" id="{C3D140CC-04E9-4323-BB8F-22C2481FFE9A}"/>
-              </a:ext>
-            </a:extLst>
-          </p:cNvPr>
-          <p:cNvPicPr>
-            <a:picLocks noChangeAspect="1"/>
-          </p:cNvPicPr>
-          <p:nvPr/>
-        </p:nvPicPr>
-        <p:blipFill>
-          <a:blip r:embed="rId3"/>
-          <a:stretch>
-            <a:fillRect/>
-          </a:stretch>
-        </p:blipFill>
-        <p:spPr>
-          <a:xfrm>
-            <a:off x="7331490" y="2667698"/>
-            <a:ext cx="4534157" cy="1587837"/>
-          </a:xfrm>
-          <a:prstGeom prst="rect">
-            <a:avLst/>
-          </a:prstGeom>
-        </p:spPr>
-      </p:pic>
-      <p:pic>
-        <p:nvPicPr>
-          <p:cNvPr id="12" name="Image 11">
-            <a:extLst>
-              <a:ext uri="{FF2B5EF4-FFF2-40B4-BE49-F238E27FC236}">
-                <a16:creationId xmlns:a16="http://schemas.microsoft.com/office/drawing/2014/main" id="{E1B930A6-936A-4ACE-9770-E36A3755ABC5}"/>
-              </a:ext>
-            </a:extLst>
-          </p:cNvPr>
-          <p:cNvPicPr>
-            <a:picLocks noChangeAspect="1"/>
-          </p:cNvPicPr>
-          <p:nvPr/>
-        </p:nvPicPr>
-        <p:blipFill>
-          <a:blip r:embed="rId4"/>
-          <a:stretch>
-            <a:fillRect/>
-          </a:stretch>
-        </p:blipFill>
-        <p:spPr>
-          <a:xfrm>
-            <a:off x="1688972" y="3147247"/>
-            <a:ext cx="1829055" cy="628738"/>
-          </a:xfrm>
-          <a:prstGeom prst="rect">
-            <a:avLst/>
-          </a:prstGeom>
-        </p:spPr>
-      </p:pic>
-    </p:spTree>
-    <p:extLst>
-      <p:ext uri="{BB962C8B-B14F-4D97-AF65-F5344CB8AC3E}">
-        <p14:creationId xmlns:p14="http://schemas.microsoft.com/office/powerpoint/2010/main" val="1688452891"/>
       </p:ext>
     </p:extLst>
   </p:cSld>
@@ -4749,7 +4318,7 @@
       </p:grpSpPr>
       <p:pic>
         <p:nvPicPr>
-          <p:cNvPr id="9" name="Image 8" descr="Une image contenant arme&#10;&#10;Description générée automatiquement">
+          <p:cNvPr id="9" name="Image 8">
             <a:extLst>
               <a:ext uri="{FF2B5EF4-FFF2-40B4-BE49-F238E27FC236}">
                 <a16:creationId xmlns:a16="http://schemas.microsoft.com/office/drawing/2014/main" id="{6FFA51AF-752E-48E0-A823-603009AC6AF1}"/>
@@ -4769,14 +4338,13 @@
               </a:ext>
             </a:extLst>
           </a:blip>
-          <a:stretch>
-            <a:fillRect/>
-          </a:stretch>
+          <a:srcRect/>
+          <a:stretch/>
         </p:blipFill>
         <p:spPr>
           <a:xfrm>
-            <a:off x="1946988" y="-673617"/>
-            <a:ext cx="8298024" cy="8205234"/>
+            <a:off x="1946988" y="-37347"/>
+            <a:ext cx="8298024" cy="6932694"/>
           </a:xfrm>
           <a:prstGeom prst="rect">
             <a:avLst/>
@@ -4855,10 +4423,10 @@
       </p:grpSpPr>
       <p:pic>
         <p:nvPicPr>
-          <p:cNvPr id="16" name="Image 15" descr="Une image contenant arme&#10;&#10;Description générée automatiquement">
-            <a:extLst>
-              <a:ext uri="{FF2B5EF4-FFF2-40B4-BE49-F238E27FC236}">
-                <a16:creationId xmlns:a16="http://schemas.microsoft.com/office/drawing/2014/main" id="{83760680-24B5-4E26-A2A3-CABE065DAAC4}"/>
+          <p:cNvPr id="14" name="Image 13">
+            <a:extLst>
+              <a:ext uri="{FF2B5EF4-FFF2-40B4-BE49-F238E27FC236}">
+                <a16:creationId xmlns:a16="http://schemas.microsoft.com/office/drawing/2014/main" id="{CFE35169-E72E-46FC-A880-B4526C5A7FA5}"/>
               </a:ext>
             </a:extLst>
           </p:cNvPr>
@@ -4875,14 +4443,13 @@
               </a:ext>
             </a:extLst>
           </a:blip>
-          <a:stretch>
-            <a:fillRect/>
-          </a:stretch>
+          <a:srcRect/>
+          <a:stretch/>
         </p:blipFill>
         <p:spPr>
           <a:xfrm rot="12211122">
-            <a:off x="-1743927" y="-5073941"/>
-            <a:ext cx="6935554" cy="6858000"/>
+            <a:off x="-1707608" y="-4046484"/>
+            <a:ext cx="6935554" cy="5794400"/>
           </a:xfrm>
           <a:prstGeom prst="rect">
             <a:avLst/>
@@ -4903,7 +4470,7 @@
         </p:nvSpPr>
         <p:spPr>
           <a:xfrm>
-            <a:off x="317500" y="739371"/>
+            <a:off x="317500" y="1632895"/>
             <a:ext cx="11582400" cy="400110"/>
           </a:xfrm>
           <a:prstGeom prst="rect">
@@ -4919,7 +4486,7 @@
           <a:p>
             <a:r>
               <a:rPr lang="fr-FR" sz="2000" b="1" dirty="0"/>
-              <a:t>Mission</a:t>
+              <a:t>Rappel de la demande</a:t>
             </a:r>
             <a:endParaRPr lang="fr-FR" sz="1400" b="1" dirty="0"/>
           </a:p>
@@ -4983,7 +4550,7 @@
         </p:nvSpPr>
         <p:spPr>
           <a:xfrm>
-            <a:off x="317500" y="2580194"/>
+            <a:off x="317500" y="3873612"/>
             <a:ext cx="11582400" cy="400110"/>
           </a:xfrm>
           <a:prstGeom prst="rect">
@@ -5019,7 +4586,7 @@
         </p:nvSpPr>
         <p:spPr>
           <a:xfrm>
-            <a:off x="700636" y="3063591"/>
+            <a:off x="700636" y="4357009"/>
             <a:ext cx="11199264" cy="369332"/>
           </a:xfrm>
           <a:prstGeom prst="rect">
@@ -5054,7 +4621,7 @@
         </p:nvSpPr>
         <p:spPr>
           <a:xfrm>
-            <a:off x="700636" y="3608543"/>
+            <a:off x="700636" y="4901961"/>
             <a:ext cx="11199264" cy="369332"/>
           </a:xfrm>
           <a:prstGeom prst="rect">
@@ -5070,17 +4637,17 @@
           <a:p>
             <a:r>
               <a:rPr lang="fr-FR" dirty="0"/>
-              <a:t>Les fonctionnalités</a:t>
-            </a:r>
-          </a:p>
-        </p:txBody>
-      </p:sp>
-      <p:sp>
-        <p:nvSpPr>
-          <p:cNvPr id="24" name="ZoneTexte 23">
-            <a:extLst>
-              <a:ext uri="{FF2B5EF4-FFF2-40B4-BE49-F238E27FC236}">
-                <a16:creationId xmlns:a16="http://schemas.microsoft.com/office/drawing/2014/main" id="{498BA6B7-5E0B-4939-93EC-94E80CB6A709}"/>
+              <a:t>Les mécanismes et la gestion du panier</a:t>
+            </a:r>
+          </a:p>
+        </p:txBody>
+      </p:sp>
+      <p:sp>
+        <p:nvSpPr>
+          <p:cNvPr id="26" name="ZoneTexte 25">
+            <a:extLst>
+              <a:ext uri="{FF2B5EF4-FFF2-40B4-BE49-F238E27FC236}">
+                <a16:creationId xmlns:a16="http://schemas.microsoft.com/office/drawing/2014/main" id="{8E34A4FE-E6D0-40C9-94BB-85994B93CFC3}"/>
               </a:ext>
             </a:extLst>
           </p:cNvPr>
@@ -5089,7 +4656,7 @@
         </p:nvSpPr>
         <p:spPr>
           <a:xfrm>
-            <a:off x="700636" y="4153495"/>
+            <a:off x="700636" y="2119945"/>
             <a:ext cx="11199264" cy="369332"/>
           </a:xfrm>
           <a:prstGeom prst="rect">
@@ -5105,17 +4672,17 @@
           <a:p>
             <a:r>
               <a:rPr lang="fr-FR" dirty="0"/>
-              <a:t>La gestion du panier</a:t>
-            </a:r>
-          </a:p>
-        </p:txBody>
-      </p:sp>
-      <p:sp>
-        <p:nvSpPr>
-          <p:cNvPr id="26" name="ZoneTexte 25">
-            <a:extLst>
-              <a:ext uri="{FF2B5EF4-FFF2-40B4-BE49-F238E27FC236}">
-                <a16:creationId xmlns:a16="http://schemas.microsoft.com/office/drawing/2014/main" id="{8E34A4FE-E6D0-40C9-94BB-85994B93CFC3}"/>
+              <a:t>Créer un premier MVP (Minimum Viable Product)</a:t>
+            </a:r>
+          </a:p>
+        </p:txBody>
+      </p:sp>
+      <p:sp>
+        <p:nvSpPr>
+          <p:cNvPr id="27" name="ZoneTexte 26">
+            <a:extLst>
+              <a:ext uri="{FF2B5EF4-FFF2-40B4-BE49-F238E27FC236}">
+                <a16:creationId xmlns:a16="http://schemas.microsoft.com/office/drawing/2014/main" id="{D1107722-78E8-49FD-BA74-51C0C4A2A0B4}"/>
               </a:ext>
             </a:extLst>
           </p:cNvPr>
@@ -5124,7 +4691,7 @@
         </p:nvSpPr>
         <p:spPr>
           <a:xfrm>
-            <a:off x="700636" y="1226421"/>
+            <a:off x="700636" y="2568480"/>
             <a:ext cx="11199264" cy="369332"/>
           </a:xfrm>
           <a:prstGeom prst="rect">
@@ -5140,17 +4707,17 @@
           <a:p>
             <a:r>
               <a:rPr lang="fr-FR" dirty="0"/>
-              <a:t>Créer un premier MVP</a:t>
-            </a:r>
-          </a:p>
-        </p:txBody>
-      </p:sp>
-      <p:sp>
-        <p:nvSpPr>
-          <p:cNvPr id="27" name="ZoneTexte 26">
-            <a:extLst>
-              <a:ext uri="{FF2B5EF4-FFF2-40B4-BE49-F238E27FC236}">
-                <a16:creationId xmlns:a16="http://schemas.microsoft.com/office/drawing/2014/main" id="{D1107722-78E8-49FD-BA74-51C0C4A2A0B4}"/>
+              <a:t>Démontrer le fonctionnement de l’application</a:t>
+            </a:r>
+          </a:p>
+        </p:txBody>
+      </p:sp>
+      <p:sp>
+        <p:nvSpPr>
+          <p:cNvPr id="28" name="ZoneTexte 27">
+            <a:extLst>
+              <a:ext uri="{FF2B5EF4-FFF2-40B4-BE49-F238E27FC236}">
+                <a16:creationId xmlns:a16="http://schemas.microsoft.com/office/drawing/2014/main" id="{431EAEA9-7CC0-46B0-80AA-EE5CE641BBB2}"/>
               </a:ext>
             </a:extLst>
           </p:cNvPr>
@@ -5159,7 +4726,7 @@
         </p:nvSpPr>
         <p:spPr>
           <a:xfrm>
-            <a:off x="700636" y="1674956"/>
+            <a:off x="700636" y="3021099"/>
             <a:ext cx="11199264" cy="369332"/>
           </a:xfrm>
           <a:prstGeom prst="rect">
@@ -5175,17 +4742,17 @@
           <a:p>
             <a:r>
               <a:rPr lang="fr-FR" dirty="0"/>
-              <a:t>Démontrer le fonctionnement de l’application</a:t>
-            </a:r>
-          </a:p>
-        </p:txBody>
-      </p:sp>
-      <p:sp>
-        <p:nvSpPr>
-          <p:cNvPr id="28" name="ZoneTexte 27">
-            <a:extLst>
-              <a:ext uri="{FF2B5EF4-FFF2-40B4-BE49-F238E27FC236}">
-                <a16:creationId xmlns:a16="http://schemas.microsoft.com/office/drawing/2014/main" id="{431EAEA9-7CC0-46B0-80AA-EE5CE641BBB2}"/>
+              <a:t>Réaliser un plan de test</a:t>
+            </a:r>
+          </a:p>
+        </p:txBody>
+      </p:sp>
+      <p:sp>
+        <p:nvSpPr>
+          <p:cNvPr id="13" name="ZoneTexte 12">
+            <a:extLst>
+              <a:ext uri="{FF2B5EF4-FFF2-40B4-BE49-F238E27FC236}">
+                <a16:creationId xmlns:a16="http://schemas.microsoft.com/office/drawing/2014/main" id="{7D5AADF3-24CB-436C-80BB-8EBA331962D0}"/>
               </a:ext>
             </a:extLst>
           </p:cNvPr>
@@ -5194,42 +4761,7 @@
         </p:nvSpPr>
         <p:spPr>
           <a:xfrm>
-            <a:off x="700636" y="2127575"/>
-            <a:ext cx="11199264" cy="369332"/>
-          </a:xfrm>
-          <a:prstGeom prst="rect">
-            <a:avLst/>
-          </a:prstGeom>
-          <a:noFill/>
-        </p:spPr>
-        <p:txBody>
-          <a:bodyPr wrap="square" rtlCol="0">
-            <a:spAutoFit/>
-          </a:bodyPr>
-          <a:lstStyle/>
-          <a:p>
-            <a:r>
-              <a:rPr lang="fr-FR" dirty="0"/>
-              <a:t>Réalisation d’un plan de test</a:t>
-            </a:r>
-          </a:p>
-        </p:txBody>
-      </p:sp>
-      <p:sp>
-        <p:nvSpPr>
-          <p:cNvPr id="13" name="ZoneTexte 12">
-            <a:extLst>
-              <a:ext uri="{FF2B5EF4-FFF2-40B4-BE49-F238E27FC236}">
-                <a16:creationId xmlns:a16="http://schemas.microsoft.com/office/drawing/2014/main" id="{7D5AADF3-24CB-436C-80BB-8EBA331962D0}"/>
-              </a:ext>
-            </a:extLst>
-          </p:cNvPr>
-          <p:cNvSpPr txBox="1"/>
-          <p:nvPr/>
-        </p:nvSpPr>
-        <p:spPr>
-          <a:xfrm>
-            <a:off x="700636" y="4698447"/>
+            <a:off x="700636" y="5446913"/>
             <a:ext cx="11199264" cy="369332"/>
           </a:xfrm>
           <a:prstGeom prst="rect">
@@ -5290,7 +4822,7 @@
       </p:grpSpPr>
       <p:pic>
         <p:nvPicPr>
-          <p:cNvPr id="9" name="Image 8" descr="Une image contenant arme&#10;&#10;Description générée automatiquement">
+          <p:cNvPr id="9" name="Image 8">
             <a:extLst>
               <a:ext uri="{FF2B5EF4-FFF2-40B4-BE49-F238E27FC236}">
                 <a16:creationId xmlns:a16="http://schemas.microsoft.com/office/drawing/2014/main" id="{6FFA51AF-752E-48E0-A823-603009AC6AF1}"/>
@@ -5310,14 +4842,13 @@
               </a:ext>
             </a:extLst>
           </a:blip>
-          <a:stretch>
-            <a:fillRect/>
-          </a:stretch>
+          <a:srcRect/>
+          <a:stretch/>
         </p:blipFill>
         <p:spPr>
           <a:xfrm>
-            <a:off x="1946988" y="-673617"/>
-            <a:ext cx="8298024" cy="8205234"/>
+            <a:off x="1946988" y="-37347"/>
+            <a:ext cx="8298024" cy="6932694"/>
           </a:xfrm>
           <a:prstGeom prst="rect">
             <a:avLst/>
@@ -5396,7 +4927,7 @@
       </p:grpSpPr>
       <p:pic>
         <p:nvPicPr>
-          <p:cNvPr id="16" name="Image 15" descr="Une image contenant arme&#10;&#10;Description générée automatiquement">
+          <p:cNvPr id="16" name="Image 15">
             <a:extLst>
               <a:ext uri="{FF2B5EF4-FFF2-40B4-BE49-F238E27FC236}">
                 <a16:creationId xmlns:a16="http://schemas.microsoft.com/office/drawing/2014/main" id="{83760680-24B5-4E26-A2A3-CABE065DAAC4}"/>
@@ -5416,14 +4947,13 @@
               </a:ext>
             </a:extLst>
           </a:blip>
-          <a:stretch>
-            <a:fillRect/>
-          </a:stretch>
+          <a:srcRect/>
+          <a:stretch/>
         </p:blipFill>
         <p:spPr>
           <a:xfrm rot="12211122">
-            <a:off x="-1743927" y="-5073941"/>
-            <a:ext cx="6935554" cy="6858000"/>
+            <a:off x="-1707608" y="-4046484"/>
+            <a:ext cx="6935554" cy="5794400"/>
           </a:xfrm>
           <a:prstGeom prst="rect">
             <a:avLst/>
@@ -5638,10 +5168,10 @@
       </p:grpSpPr>
       <p:pic>
         <p:nvPicPr>
-          <p:cNvPr id="16" name="Image 15" descr="Une image contenant arme&#10;&#10;Description générée automatiquement">
-            <a:extLst>
-              <a:ext uri="{FF2B5EF4-FFF2-40B4-BE49-F238E27FC236}">
-                <a16:creationId xmlns:a16="http://schemas.microsoft.com/office/drawing/2014/main" id="{83760680-24B5-4E26-A2A3-CABE065DAAC4}"/>
+          <p:cNvPr id="10" name="Image 9">
+            <a:extLst>
+              <a:ext uri="{FF2B5EF4-FFF2-40B4-BE49-F238E27FC236}">
+                <a16:creationId xmlns:a16="http://schemas.microsoft.com/office/drawing/2014/main" id="{6E273E89-13D3-4B06-8DBC-9BF5486C9862}"/>
               </a:ext>
             </a:extLst>
           </p:cNvPr>
@@ -5658,14 +5188,13 @@
               </a:ext>
             </a:extLst>
           </a:blip>
-          <a:stretch>
-            <a:fillRect/>
-          </a:stretch>
+          <a:srcRect/>
+          <a:stretch/>
         </p:blipFill>
         <p:spPr>
           <a:xfrm rot="12211122">
-            <a:off x="-1743927" y="-5073941"/>
-            <a:ext cx="6935554" cy="6858000"/>
+            <a:off x="-1707608" y="-4046484"/>
+            <a:ext cx="6935554" cy="5794400"/>
           </a:xfrm>
           <a:prstGeom prst="rect">
             <a:avLst/>
@@ -5896,10 +5425,10 @@
       </p:grpSpPr>
       <p:pic>
         <p:nvPicPr>
-          <p:cNvPr id="16" name="Image 15" descr="Une image contenant arme&#10;&#10;Description générée automatiquement">
-            <a:extLst>
-              <a:ext uri="{FF2B5EF4-FFF2-40B4-BE49-F238E27FC236}">
-                <a16:creationId xmlns:a16="http://schemas.microsoft.com/office/drawing/2014/main" id="{83760680-24B5-4E26-A2A3-CABE065DAAC4}"/>
+          <p:cNvPr id="6" name="Image 5">
+            <a:extLst>
+              <a:ext uri="{FF2B5EF4-FFF2-40B4-BE49-F238E27FC236}">
+                <a16:creationId xmlns:a16="http://schemas.microsoft.com/office/drawing/2014/main" id="{3550C047-2896-40AB-BB2C-B89A1901C8D3}"/>
               </a:ext>
             </a:extLst>
           </p:cNvPr>
@@ -5916,14 +5445,13 @@
               </a:ext>
             </a:extLst>
           </a:blip>
-          <a:stretch>
-            <a:fillRect/>
-          </a:stretch>
+          <a:srcRect/>
+          <a:stretch/>
         </p:blipFill>
         <p:spPr>
           <a:xfrm rot="12211122">
-            <a:off x="-1743927" y="-5073941"/>
-            <a:ext cx="6935554" cy="6858000"/>
+            <a:off x="-1707608" y="-4046484"/>
+            <a:ext cx="6935554" cy="5794400"/>
           </a:xfrm>
           <a:prstGeom prst="rect">
             <a:avLst/>
@@ -6080,7 +5608,7 @@
       </p:grpSpPr>
       <p:pic>
         <p:nvPicPr>
-          <p:cNvPr id="9" name="Image 8" descr="Une image contenant arme&#10;&#10;Description générée automatiquement">
+          <p:cNvPr id="9" name="Image 8">
             <a:extLst>
               <a:ext uri="{FF2B5EF4-FFF2-40B4-BE49-F238E27FC236}">
                 <a16:creationId xmlns:a16="http://schemas.microsoft.com/office/drawing/2014/main" id="{6FFA51AF-752E-48E0-A823-603009AC6AF1}"/>
@@ -6100,14 +5628,13 @@
               </a:ext>
             </a:extLst>
           </a:blip>
-          <a:stretch>
-            <a:fillRect/>
-          </a:stretch>
+          <a:srcRect/>
+          <a:stretch/>
         </p:blipFill>
         <p:spPr>
           <a:xfrm>
-            <a:off x="1946988" y="-673617"/>
-            <a:ext cx="8298024" cy="8205234"/>
+            <a:off x="1946988" y="-37347"/>
+            <a:ext cx="8298024" cy="6932694"/>
           </a:xfrm>
           <a:prstGeom prst="rect">
             <a:avLst/>
@@ -6208,10 +5735,10 @@
       </p:grpSpPr>
       <p:pic>
         <p:nvPicPr>
-          <p:cNvPr id="16" name="Image 15" descr="Une image contenant arme&#10;&#10;Description générée automatiquement">
-            <a:extLst>
-              <a:ext uri="{FF2B5EF4-FFF2-40B4-BE49-F238E27FC236}">
-                <a16:creationId xmlns:a16="http://schemas.microsoft.com/office/drawing/2014/main" id="{83760680-24B5-4E26-A2A3-CABE065DAAC4}"/>
+          <p:cNvPr id="8" name="Image 7">
+            <a:extLst>
+              <a:ext uri="{FF2B5EF4-FFF2-40B4-BE49-F238E27FC236}">
+                <a16:creationId xmlns:a16="http://schemas.microsoft.com/office/drawing/2014/main" id="{5319EE11-CC8D-49CF-B7D7-5DF614EA7DF4}"/>
               </a:ext>
             </a:extLst>
           </p:cNvPr>
@@ -6228,14 +5755,13 @@
               </a:ext>
             </a:extLst>
           </a:blip>
-          <a:stretch>
-            <a:fillRect/>
-          </a:stretch>
+          <a:srcRect/>
+          <a:stretch/>
         </p:blipFill>
         <p:spPr>
           <a:xfrm rot="12211122">
-            <a:off x="-1743927" y="-5073941"/>
-            <a:ext cx="6935554" cy="6858000"/>
+            <a:off x="-1707608" y="-4046484"/>
+            <a:ext cx="6935554" cy="5794400"/>
           </a:xfrm>
           <a:prstGeom prst="rect">
             <a:avLst/>

</xml_diff>